<commit_message>
Fix slide 11 content overlap in presentation
- Reduce spacing between value propositions (1.35 -> 1.05 inches)
- Adjust CTA box position to avoid overlap

Co-Authored-By: Claude Opus 4.5 <noreply@anthropic.com>
</commit_message>
<xml_diff>
--- a/GREmLN_MCP_Server_Presentation.pptx
+++ b/GREmLN_MCP_Server_Presentation.pptx
@@ -4383,8 +4383,8 @@
         </p:nvSpPr>
         <p:spPr>
           <a:xfrm>
-            <a:off x="548640" y="1554480"/>
-            <a:ext cx="137160" cy="1005840"/>
+            <a:off x="548640" y="1463040"/>
+            <a:ext cx="137160" cy="822960"/>
           </a:xfrm>
           <a:prstGeom prst="rect">
             <a:avLst/>
@@ -4426,7 +4426,7 @@
         </p:nvSpPr>
         <p:spPr>
           <a:xfrm>
-            <a:off x="914400" y="1554480"/>
+            <a:off x="914400" y="1463040"/>
             <a:ext cx="3657600" cy="548640"/>
           </a:xfrm>
           <a:prstGeom prst="rect">
@@ -4461,7 +4461,7 @@
         </p:nvSpPr>
         <p:spPr>
           <a:xfrm>
-            <a:off x="914400" y="2057400"/>
+            <a:off x="914400" y="1874520"/>
             <a:ext cx="10058400" cy="457200"/>
           </a:xfrm>
           <a:prstGeom prst="rect">
@@ -4496,8 +4496,8 @@
         </p:nvSpPr>
         <p:spPr>
           <a:xfrm>
-            <a:off x="548640" y="2788920"/>
-            <a:ext cx="137160" cy="1005840"/>
+            <a:off x="548640" y="2423160"/>
+            <a:ext cx="137160" cy="822960"/>
           </a:xfrm>
           <a:prstGeom prst="rect">
             <a:avLst/>
@@ -4539,7 +4539,7 @@
         </p:nvSpPr>
         <p:spPr>
           <a:xfrm>
-            <a:off x="914400" y="2788920"/>
+            <a:off x="914400" y="2423160"/>
             <a:ext cx="3657600" cy="548640"/>
           </a:xfrm>
           <a:prstGeom prst="rect">
@@ -4574,7 +4574,7 @@
         </p:nvSpPr>
         <p:spPr>
           <a:xfrm>
-            <a:off x="914400" y="3291840"/>
+            <a:off x="914400" y="2834640"/>
             <a:ext cx="10058400" cy="457200"/>
           </a:xfrm>
           <a:prstGeom prst="rect">
@@ -4609,8 +4609,8 @@
         </p:nvSpPr>
         <p:spPr>
           <a:xfrm>
-            <a:off x="548640" y="4023360"/>
-            <a:ext cx="137160" cy="1005840"/>
+            <a:off x="548640" y="3383280"/>
+            <a:ext cx="137160" cy="822960"/>
           </a:xfrm>
           <a:prstGeom prst="rect">
             <a:avLst/>
@@ -4652,7 +4652,7 @@
         </p:nvSpPr>
         <p:spPr>
           <a:xfrm>
-            <a:off x="914400" y="4023360"/>
+            <a:off x="914400" y="3383280"/>
             <a:ext cx="3657600" cy="548640"/>
           </a:xfrm>
           <a:prstGeom prst="rect">
@@ -4687,7 +4687,7 @@
         </p:nvSpPr>
         <p:spPr>
           <a:xfrm>
-            <a:off x="914400" y="4526280"/>
+            <a:off x="914400" y="3794760"/>
             <a:ext cx="10058400" cy="457200"/>
           </a:xfrm>
           <a:prstGeom prst="rect">
@@ -4722,8 +4722,8 @@
         </p:nvSpPr>
         <p:spPr>
           <a:xfrm>
-            <a:off x="548640" y="5257800"/>
-            <a:ext cx="137160" cy="1005840"/>
+            <a:off x="548640" y="4343400"/>
+            <a:ext cx="137160" cy="822960"/>
           </a:xfrm>
           <a:prstGeom prst="rect">
             <a:avLst/>
@@ -4765,7 +4765,7 @@
         </p:nvSpPr>
         <p:spPr>
           <a:xfrm>
-            <a:off x="914400" y="5257800"/>
+            <a:off x="914400" y="4343400"/>
             <a:ext cx="3657600" cy="548640"/>
           </a:xfrm>
           <a:prstGeom prst="rect">
@@ -4800,7 +4800,7 @@
         </p:nvSpPr>
         <p:spPr>
           <a:xfrm>
-            <a:off x="914400" y="5760720"/>
+            <a:off x="914400" y="4754880"/>
             <a:ext cx="10058400" cy="457200"/>
           </a:xfrm>
           <a:prstGeom prst="rect">
@@ -4835,7 +4835,7 @@
         </p:nvSpPr>
         <p:spPr>
           <a:xfrm>
-            <a:off x="2743200" y="5486400"/>
+            <a:off x="2743200" y="5303520"/>
             <a:ext cx="6705295" cy="914400"/>
           </a:xfrm>
           <a:prstGeom prst="roundRect">
@@ -4878,7 +4878,7 @@
         </p:nvSpPr>
         <p:spPr>
           <a:xfrm>
-            <a:off x="2743200" y="5715000"/>
+            <a:off x="2743200" y="5532120"/>
             <a:ext cx="6705295" cy="548640"/>
           </a:xfrm>
           <a:prstGeom prst="rect">

</xml_diff>

<commit_message>
Update perturbation slide with cascading fallback flowchart
Shows 6-step fallback process:
1. GRN edges check → BFS propagation
2. STRING protein interaction fallback
3. Embedding similarity fallback
4. LINCS perturbation signature fallback
5. Super-enhancer (chromatin) fallback
6. Minimal embedding-only ranking

Each step routes to GRN-active nodes when possible.

Co-Authored-By: Claude Opus 4.5 <noreply@anthropic.com>
</commit_message>
<xml_diff>
--- a/GREmLN_MCP_Server_Presentation.pptx
+++ b/GREmLN_MCP_Server_Presentation.pptx
@@ -8162,7 +8162,7 @@
         <p:spPr>
           <a:xfrm>
             <a:off x="0" y="0"/>
-            <a:ext cx="12191695" cy="1280160"/>
+            <a:ext cx="12191695" cy="1097280"/>
           </a:xfrm>
           <a:prstGeom prst="rect">
             <a:avLst/>
@@ -8204,8 +8204,8 @@
         </p:nvSpPr>
         <p:spPr>
           <a:xfrm>
-            <a:off x="548640" y="365760"/>
-            <a:ext cx="11094415" cy="822960"/>
+            <a:off x="548640" y="320040"/>
+            <a:ext cx="11094415" cy="731520"/>
           </a:xfrm>
           <a:prstGeom prst="rect">
             <a:avLst/>
@@ -8219,14 +8219,14 @@
           <a:lstStyle/>
           <a:p>
             <a:pPr>
-              <a:defRPr sz="3600" b="1">
+              <a:defRPr sz="3200" b="1">
                 <a:solidFill>
                   <a:srgbClr val="FFFFFF"/>
                 </a:solidFill>
               </a:defRPr>
             </a:pPr>
             <a:r>
-              <a:t>Perturbation Analysis Algorithm</a:t>
+              <a:t>Perturbation Analysis: Cascading Fallback</a:t>
             </a:r>
           </a:p>
         </p:txBody>
@@ -8239,8 +8239,8 @@
         </p:nvSpPr>
         <p:spPr>
           <a:xfrm>
-            <a:off x="457200" y="1463040"/>
-            <a:ext cx="731520" cy="731520"/>
+            <a:off x="365760" y="1234440"/>
+            <a:ext cx="457200" cy="457200"/>
           </a:xfrm>
           <a:prstGeom prst="roundRect">
             <a:avLst>
@@ -8273,7 +8273,7 @@
           <a:lstStyle/>
           <a:p>
             <a:pPr algn="ctr">
-              <a:defRPr sz="2800" b="1">
+              <a:defRPr sz="1800" b="1">
                 <a:solidFill>
                   <a:srgbClr val="FFFFFF"/>
                 </a:solidFill>
@@ -8287,95 +8287,25 @@
       </p:sp>
       <p:sp>
         <p:nvSpPr>
-          <p:cNvPr id="7" name="TextBox 6"/>
-          <p:cNvSpPr txBox="1"/>
-          <p:nvPr/>
-        </p:nvSpPr>
-        <p:spPr>
-          <a:xfrm>
-            <a:off x="1371600" y="1463040"/>
-            <a:ext cx="3657600" cy="457200"/>
-          </a:xfrm>
-          <a:prstGeom prst="rect">
-            <a:avLst/>
-          </a:prstGeom>
-          <a:noFill/>
-        </p:spPr>
-        <p:txBody>
-          <a:bodyPr wrap="none">
-            <a:spAutoFit/>
-          </a:bodyPr>
-          <a:lstStyle/>
-          <a:p>
-            <a:pPr>
-              <a:defRPr sz="2200" b="1">
-                <a:solidFill>
-                  <a:srgbClr val="009B9E"/>
-                </a:solidFill>
-              </a:defRPr>
-            </a:pPr>
-            <a:r>
-              <a:t>Network Propagation</a:t>
-            </a:r>
-          </a:p>
-        </p:txBody>
-      </p:sp>
-      <p:sp>
-        <p:nvSpPr>
-          <p:cNvPr id="8" name="TextBox 7"/>
-          <p:cNvSpPr txBox="1"/>
-          <p:nvPr/>
-        </p:nvSpPr>
-        <p:spPr>
-          <a:xfrm>
-            <a:off x="1371600" y="1920240"/>
-            <a:ext cx="4572000" cy="914400"/>
-          </a:xfrm>
-          <a:prstGeom prst="rect">
-            <a:avLst/>
-          </a:prstGeom>
-          <a:noFill/>
-        </p:spPr>
-        <p:txBody>
-          <a:bodyPr wrap="square">
-            <a:spAutoFit/>
-          </a:bodyPr>
-          <a:lstStyle/>
-          <a:p>
-            <a:pPr>
-              <a:defRPr sz="1600">
-                <a:solidFill>
-                  <a:srgbClr val="2D3A4A"/>
-                </a:solidFill>
-              </a:defRPr>
-            </a:pPr>
-            <a:r>
-              <a:t>Walk through regulatory network using BFS. Edge weights (mutual information) determine effect strength as signal propagates.</a:t>
-            </a:r>
-          </a:p>
-        </p:txBody>
-      </p:sp>
-      <p:sp>
-        <p:nvSpPr>
-          <p:cNvPr id="9" name="Rounded Rectangle 8"/>
+          <p:cNvPr id="7" name="Rounded Rectangle 6"/>
           <p:cNvSpPr/>
           <p:nvPr/>
         </p:nvSpPr>
         <p:spPr>
           <a:xfrm>
-            <a:off x="5943600" y="1417320"/>
-            <a:ext cx="1005840" cy="457200"/>
+            <a:off x="914400" y="1234440"/>
+            <a:ext cx="4754880" cy="1371600"/>
           </a:xfrm>
           <a:prstGeom prst="roundRect">
-            <a:avLst>
-              <a:gd name="adj" fmla="val 15000"/>
-            </a:avLst>
-          </a:prstGeom>
-          <a:solidFill>
-            <a:srgbClr val="E86C2C"/>
-          </a:solidFill>
-          <a:ln>
-            <a:noFill/>
+            <a:avLst/>
+          </a:prstGeom>
+          <a:solidFill>
+            <a:srgbClr val="F0F8FF"/>
+          </a:solidFill>
+          <a:ln w="25400">
+            <a:solidFill>
+              <a:srgbClr val="009B9E"/>
+            </a:solidFill>
           </a:ln>
         </p:spPr>
         <p:style>
@@ -8393,32 +8323,23 @@
           </a:fontRef>
         </p:style>
         <p:txBody>
-          <a:bodyPr rtlCol="0" anchor="ctr" wrap="square"/>
-          <a:lstStyle/>
-          <a:p>
-            <a:pPr algn="ctr">
-              <a:defRPr sz="1200" b="1">
-                <a:solidFill>
-                  <a:srgbClr val="FFFFFF"/>
-                </a:solidFill>
-              </a:defRPr>
-            </a:pPr>
-            <a:r>
-              <a:t>MYC</a:t>
-            </a:r>
-          </a:p>
-        </p:txBody>
-      </p:sp>
-      <p:sp>
-        <p:nvSpPr>
-          <p:cNvPr id="10" name="TextBox 9"/>
+          <a:bodyPr rtlCol="0" anchor="ctr"/>
+          <a:lstStyle/>
+          <a:p>
+            <a:pPr algn="ctr"/>
+          </a:p>
+        </p:txBody>
+      </p:sp>
+      <p:sp>
+        <p:nvSpPr>
+          <p:cNvPr id="8" name="TextBox 7"/>
           <p:cNvSpPr txBox="1"/>
           <p:nvPr/>
         </p:nvSpPr>
         <p:spPr>
           <a:xfrm>
-            <a:off x="5943600" y="1874519"/>
-            <a:ext cx="1005840" cy="274320"/>
+            <a:off x="1051560" y="1307592"/>
+            <a:ext cx="4480560" cy="1280160"/>
           </a:xfrm>
           <a:prstGeom prst="rect">
             <a:avLst/>
@@ -8426,40 +8347,78 @@
           <a:noFill/>
         </p:spPr>
         <p:txBody>
-          <a:bodyPr wrap="none">
+          <a:bodyPr wrap="square">
             <a:spAutoFit/>
           </a:bodyPr>
           <a:lstStyle/>
           <a:p>
-            <a:pPr algn="ctr">
-              <a:defRPr sz="1000" b="1">
+            <a:pPr>
+              <a:defRPr sz="1400" b="1">
+                <a:solidFill>
+                  <a:srgbClr val="009B9E"/>
+                </a:solidFill>
+              </a:defRPr>
+            </a:pPr>
+            <a:r>
+              <a:t>Check GRN Edges</a:t>
+            </a:r>
+          </a:p>
+          <a:p>
+            <a:pPr>
+              <a:defRPr sz="1100">
+                <a:solidFill>
+                  <a:srgbClr val="2D3A4A"/>
+                </a:solidFill>
+              </a:defRPr>
+            </a:pPr>
+            <a:r>
+              <a:t>Has outgoing regulatory edges?</a:t>
+            </a:r>
+          </a:p>
+          <a:p>
+            <a:pPr>
+              <a:defRPr sz="1000">
+                <a:solidFill>
+                  <a:srgbClr val="2EA06A"/>
+                </a:solidFill>
+              </a:defRPr>
+            </a:pPr>
+            <a:r>
+              <a:t>YES → Run BFS network propagation → END</a:t>
+            </a:r>
+          </a:p>
+          <a:p>
+            <a:pPr>
+              <a:defRPr sz="1000">
                 <a:solidFill>
                   <a:srgbClr val="E86C2C"/>
                 </a:solidFill>
               </a:defRPr>
             </a:pPr>
             <a:r>
-              <a:t>effect=1.0</a:t>
-            </a:r>
-          </a:p>
-        </p:txBody>
-      </p:sp>
-      <p:sp>
-        <p:nvSpPr>
-          <p:cNvPr id="11" name="Right Arrow 10"/>
+              <a:t>NO → network_effect = 0, continue...</a:t>
+            </a:r>
+          </a:p>
+        </p:txBody>
+      </p:sp>
+      <p:sp>
+        <p:nvSpPr>
+          <p:cNvPr id="9" name="Rounded Rectangle 8"/>
           <p:cNvSpPr/>
           <p:nvPr/>
         </p:nvSpPr>
         <p:spPr>
           <a:xfrm>
-            <a:off x="7040880" y="1600200"/>
-            <a:ext cx="457200" cy="274320"/>
-          </a:xfrm>
-          <a:prstGeom prst="rightArrow">
-            <a:avLst/>
-          </a:prstGeom>
-          <a:solidFill>
-            <a:srgbClr val="647487"/>
+            <a:off x="365760" y="2743200"/>
+            <a:ext cx="457200" cy="457200"/>
+          </a:xfrm>
+          <a:prstGeom prst="roundRect">
+            <a:avLst>
+              <a:gd name="adj" fmla="val 15000"/>
+            </a:avLst>
+          </a:prstGeom>
+          <a:solidFill>
+            <a:srgbClr val="1A568C"/>
           </a:solidFill>
           <a:ln>
             <a:noFill/>
@@ -8480,69 +8439,43 @@
           </a:fontRef>
         </p:style>
         <p:txBody>
-          <a:bodyPr rtlCol="0" anchor="ctr"/>
-          <a:lstStyle/>
-          <a:p>
-            <a:pPr algn="ctr"/>
-          </a:p>
-        </p:txBody>
-      </p:sp>
-      <p:sp>
-        <p:nvSpPr>
-          <p:cNvPr id="12" name="TextBox 11"/>
-          <p:cNvSpPr txBox="1"/>
-          <p:nvPr/>
-        </p:nvSpPr>
-        <p:spPr>
-          <a:xfrm>
-            <a:off x="6949440" y="1325880"/>
-            <a:ext cx="640080" cy="274320"/>
-          </a:xfrm>
-          <a:prstGeom prst="rect">
-            <a:avLst/>
-          </a:prstGeom>
-          <a:noFill/>
-        </p:spPr>
-        <p:txBody>
-          <a:bodyPr wrap="none">
-            <a:spAutoFit/>
-          </a:bodyPr>
+          <a:bodyPr rtlCol="0" anchor="ctr" wrap="square"/>
           <a:lstStyle/>
           <a:p>
             <a:pPr algn="ctr">
-              <a:defRPr sz="900">
-                <a:solidFill>
-                  <a:srgbClr val="647487"/>
-                </a:solidFill>
-              </a:defRPr>
-            </a:pPr>
-            <a:r>
-              <a:t>MI=0.8</a:t>
-            </a:r>
-          </a:p>
-        </p:txBody>
-      </p:sp>
-      <p:sp>
-        <p:nvSpPr>
-          <p:cNvPr id="13" name="Rounded Rectangle 12"/>
+              <a:defRPr sz="1800" b="1">
+                <a:solidFill>
+                  <a:srgbClr val="FFFFFF"/>
+                </a:solidFill>
+              </a:defRPr>
+            </a:pPr>
+            <a:r>
+              <a:t>2</a:t>
+            </a:r>
+          </a:p>
+        </p:txBody>
+      </p:sp>
+      <p:sp>
+        <p:nvSpPr>
+          <p:cNvPr id="10" name="Rounded Rectangle 9"/>
           <p:cNvSpPr/>
           <p:nvPr/>
         </p:nvSpPr>
         <p:spPr>
           <a:xfrm>
-            <a:off x="7589520" y="1417320"/>
-            <a:ext cx="1005840" cy="457200"/>
+            <a:off x="914400" y="2743200"/>
+            <a:ext cx="4754880" cy="1371600"/>
           </a:xfrm>
           <a:prstGeom prst="roundRect">
-            <a:avLst>
-              <a:gd name="adj" fmla="val 15000"/>
-            </a:avLst>
-          </a:prstGeom>
-          <a:solidFill>
-            <a:srgbClr val="1A568C"/>
-          </a:solidFill>
-          <a:ln>
-            <a:noFill/>
+            <a:avLst/>
+          </a:prstGeom>
+          <a:solidFill>
+            <a:srgbClr val="F0F8FF"/>
+          </a:solidFill>
+          <a:ln w="25400">
+            <a:solidFill>
+              <a:srgbClr val="1A568C"/>
+            </a:solidFill>
           </a:ln>
         </p:spPr>
         <p:style>
@@ -8560,32 +8493,23 @@
           </a:fontRef>
         </p:style>
         <p:txBody>
-          <a:bodyPr rtlCol="0" anchor="ctr" wrap="square"/>
-          <a:lstStyle/>
-          <a:p>
-            <a:pPr algn="ctr">
-              <a:defRPr sz="1200" b="1">
-                <a:solidFill>
-                  <a:srgbClr val="FFFFFF"/>
-                </a:solidFill>
-              </a:defRPr>
-            </a:pPr>
-            <a:r>
-              <a:t>Gene B</a:t>
-            </a:r>
-          </a:p>
-        </p:txBody>
-      </p:sp>
-      <p:sp>
-        <p:nvSpPr>
-          <p:cNvPr id="14" name="TextBox 13"/>
+          <a:bodyPr rtlCol="0" anchor="ctr"/>
+          <a:lstStyle/>
+          <a:p>
+            <a:pPr algn="ctr"/>
+          </a:p>
+        </p:txBody>
+      </p:sp>
+      <p:sp>
+        <p:nvSpPr>
+          <p:cNvPr id="11" name="TextBox 10"/>
           <p:cNvSpPr txBox="1"/>
           <p:nvPr/>
         </p:nvSpPr>
         <p:spPr>
           <a:xfrm>
-            <a:off x="7589520" y="1874519"/>
-            <a:ext cx="1005840" cy="274320"/>
+            <a:off x="1051560" y="2816352"/>
+            <a:ext cx="4480560" cy="1280160"/>
           </a:xfrm>
           <a:prstGeom prst="rect">
             <a:avLst/>
@@ -8593,40 +8517,78 @@
           <a:noFill/>
         </p:spPr>
         <p:txBody>
-          <a:bodyPr wrap="none">
+          <a:bodyPr wrap="square">
             <a:spAutoFit/>
           </a:bodyPr>
           <a:lstStyle/>
           <a:p>
-            <a:pPr algn="ctr">
-              <a:defRPr sz="1000" b="1">
+            <a:pPr>
+              <a:defRPr sz="1400" b="1">
                 <a:solidFill>
                   <a:srgbClr val="1A568C"/>
                 </a:solidFill>
               </a:defRPr>
             </a:pPr>
             <a:r>
-              <a:t>effect=0.80</a:t>
-            </a:r>
-          </a:p>
-        </p:txBody>
-      </p:sp>
-      <p:sp>
-        <p:nvSpPr>
-          <p:cNvPr id="15" name="Right Arrow 14"/>
+              <a:t>STRING Protein Interaction</a:t>
+            </a:r>
+          </a:p>
+          <a:p>
+            <a:pPr>
+              <a:defRPr sz="1100">
+                <a:solidFill>
+                  <a:srgbClr val="2D3A4A"/>
+                </a:solidFill>
+              </a:defRPr>
+            </a:pPr>
+            <a:r>
+              <a:t>Protein partner with GRN edges?</a:t>
+            </a:r>
+          </a:p>
+          <a:p>
+            <a:pPr>
+              <a:defRPr sz="1000">
+                <a:solidFill>
+                  <a:srgbClr val="2EA06A"/>
+                </a:solidFill>
+              </a:defRPr>
+            </a:pPr>
+            <a:r>
+              <a:t>YES → Route to partner → BFS → END</a:t>
+            </a:r>
+          </a:p>
+          <a:p>
+            <a:pPr>
+              <a:defRPr sz="1000">
+                <a:solidFill>
+                  <a:srgbClr val="E86C2C"/>
+                </a:solidFill>
+              </a:defRPr>
+            </a:pPr>
+            <a:r>
+              <a:t>NO → continue to next fallback...</a:t>
+            </a:r>
+          </a:p>
+        </p:txBody>
+      </p:sp>
+      <p:sp>
+        <p:nvSpPr>
+          <p:cNvPr id="12" name="Rounded Rectangle 11"/>
           <p:cNvSpPr/>
           <p:nvPr/>
         </p:nvSpPr>
         <p:spPr>
           <a:xfrm>
-            <a:off x="8686800" y="1600200"/>
-            <a:ext cx="457200" cy="274320"/>
-          </a:xfrm>
-          <a:prstGeom prst="rightArrow">
-            <a:avLst/>
-          </a:prstGeom>
-          <a:solidFill>
-            <a:srgbClr val="647487"/>
+            <a:off x="365760" y="4251960"/>
+            <a:ext cx="457200" cy="457200"/>
+          </a:xfrm>
+          <a:prstGeom prst="roundRect">
+            <a:avLst>
+              <a:gd name="adj" fmla="val 15000"/>
+            </a:avLst>
+          </a:prstGeom>
+          <a:solidFill>
+            <a:srgbClr val="9B59B6"/>
           </a:solidFill>
           <a:ln>
             <a:noFill/>
@@ -8647,69 +8609,43 @@
           </a:fontRef>
         </p:style>
         <p:txBody>
-          <a:bodyPr rtlCol="0" anchor="ctr"/>
-          <a:lstStyle/>
-          <a:p>
-            <a:pPr algn="ctr"/>
-          </a:p>
-        </p:txBody>
-      </p:sp>
-      <p:sp>
-        <p:nvSpPr>
-          <p:cNvPr id="16" name="TextBox 15"/>
-          <p:cNvSpPr txBox="1"/>
-          <p:nvPr/>
-        </p:nvSpPr>
-        <p:spPr>
-          <a:xfrm>
-            <a:off x="8595360" y="1325880"/>
-            <a:ext cx="640080" cy="274320"/>
-          </a:xfrm>
-          <a:prstGeom prst="rect">
-            <a:avLst/>
-          </a:prstGeom>
-          <a:noFill/>
-        </p:spPr>
-        <p:txBody>
-          <a:bodyPr wrap="none">
-            <a:spAutoFit/>
-          </a:bodyPr>
+          <a:bodyPr rtlCol="0" anchor="ctr" wrap="square"/>
           <a:lstStyle/>
           <a:p>
             <a:pPr algn="ctr">
-              <a:defRPr sz="900">
-                <a:solidFill>
-                  <a:srgbClr val="647487"/>
-                </a:solidFill>
-              </a:defRPr>
-            </a:pPr>
-            <a:r>
-              <a:t>MI=0.5</a:t>
-            </a:r>
-          </a:p>
-        </p:txBody>
-      </p:sp>
-      <p:sp>
-        <p:nvSpPr>
-          <p:cNvPr id="17" name="Rounded Rectangle 16"/>
+              <a:defRPr sz="1800" b="1">
+                <a:solidFill>
+                  <a:srgbClr val="FFFFFF"/>
+                </a:solidFill>
+              </a:defRPr>
+            </a:pPr>
+            <a:r>
+              <a:t>3</a:t>
+            </a:r>
+          </a:p>
+        </p:txBody>
+      </p:sp>
+      <p:sp>
+        <p:nvSpPr>
+          <p:cNvPr id="13" name="Rounded Rectangle 12"/>
           <p:cNvSpPr/>
           <p:nvPr/>
         </p:nvSpPr>
         <p:spPr>
           <a:xfrm>
-            <a:off x="9235440" y="1417320"/>
-            <a:ext cx="1005840" cy="457200"/>
+            <a:off x="914400" y="4251960"/>
+            <a:ext cx="4754880" cy="1371600"/>
           </a:xfrm>
           <a:prstGeom prst="roundRect">
-            <a:avLst>
-              <a:gd name="adj" fmla="val 15000"/>
-            </a:avLst>
-          </a:prstGeom>
-          <a:solidFill>
-            <a:srgbClr val="3A8DC1"/>
-          </a:solidFill>
-          <a:ln>
-            <a:noFill/>
+            <a:avLst/>
+          </a:prstGeom>
+          <a:solidFill>
+            <a:srgbClr val="F5F0FA"/>
+          </a:solidFill>
+          <a:ln w="25400">
+            <a:solidFill>
+              <a:srgbClr val="9B59B6"/>
+            </a:solidFill>
           </a:ln>
         </p:spPr>
         <p:style>
@@ -8727,32 +8663,23 @@
           </a:fontRef>
         </p:style>
         <p:txBody>
-          <a:bodyPr rtlCol="0" anchor="ctr" wrap="square"/>
-          <a:lstStyle/>
-          <a:p>
-            <a:pPr algn="ctr">
-              <a:defRPr sz="1200" b="1">
-                <a:solidFill>
-                  <a:srgbClr val="FFFFFF"/>
-                </a:solidFill>
-              </a:defRPr>
-            </a:pPr>
-            <a:r>
-              <a:t>Gene C</a:t>
-            </a:r>
-          </a:p>
-        </p:txBody>
-      </p:sp>
-      <p:sp>
-        <p:nvSpPr>
-          <p:cNvPr id="18" name="TextBox 17"/>
+          <a:bodyPr rtlCol="0" anchor="ctr"/>
+          <a:lstStyle/>
+          <a:p>
+            <a:pPr algn="ctr"/>
+          </a:p>
+        </p:txBody>
+      </p:sp>
+      <p:sp>
+        <p:nvSpPr>
+          <p:cNvPr id="14" name="TextBox 13"/>
           <p:cNvSpPr txBox="1"/>
           <p:nvPr/>
         </p:nvSpPr>
         <p:spPr>
           <a:xfrm>
-            <a:off x="9235440" y="1874519"/>
-            <a:ext cx="1005840" cy="274320"/>
+            <a:off x="1051560" y="4325112"/>
+            <a:ext cx="4480560" cy="1280160"/>
           </a:xfrm>
           <a:prstGeom prst="rect">
             <a:avLst/>
@@ -8760,34 +8687,70 @@
           <a:noFill/>
         </p:spPr>
         <p:txBody>
-          <a:bodyPr wrap="none">
+          <a:bodyPr wrap="square">
             <a:spAutoFit/>
           </a:bodyPr>
           <a:lstStyle/>
           <a:p>
-            <a:pPr algn="ctr">
-              <a:defRPr sz="1000" b="1">
-                <a:solidFill>
-                  <a:srgbClr val="3A8DC1"/>
-                </a:solidFill>
-              </a:defRPr>
-            </a:pPr>
-            <a:r>
-              <a:t>effect=0.40</a:t>
-            </a:r>
-          </a:p>
-        </p:txBody>
-      </p:sp>
-      <p:sp>
-        <p:nvSpPr>
-          <p:cNvPr id="19" name="Rounded Rectangle 18"/>
+            <a:pPr>
+              <a:defRPr sz="1400" b="1">
+                <a:solidFill>
+                  <a:srgbClr val="9B59B6"/>
+                </a:solidFill>
+              </a:defRPr>
+            </a:pPr>
+            <a:r>
+              <a:t>Embedding Similarity</a:t>
+            </a:r>
+          </a:p>
+          <a:p>
+            <a:pPr>
+              <a:defRPr sz="1100">
+                <a:solidFill>
+                  <a:srgbClr val="2D3A4A"/>
+                </a:solidFill>
+              </a:defRPr>
+            </a:pPr>
+            <a:r>
+              <a:t>Nearest neighbor with GRN edges?</a:t>
+            </a:r>
+          </a:p>
+          <a:p>
+            <a:pPr>
+              <a:defRPr sz="1000">
+                <a:solidFill>
+                  <a:srgbClr val="2EA06A"/>
+                </a:solidFill>
+              </a:defRPr>
+            </a:pPr>
+            <a:r>
+              <a:t>YES → Route to neighbor → BFS → END</a:t>
+            </a:r>
+          </a:p>
+          <a:p>
+            <a:pPr>
+              <a:defRPr sz="1000">
+                <a:solidFill>
+                  <a:srgbClr val="E86C2C"/>
+                </a:solidFill>
+              </a:defRPr>
+            </a:pPr>
+            <a:r>
+              <a:t>NO → continue to next fallback...</a:t>
+            </a:r>
+          </a:p>
+        </p:txBody>
+      </p:sp>
+      <p:sp>
+        <p:nvSpPr>
+          <p:cNvPr id="15" name="Rounded Rectangle 14"/>
           <p:cNvSpPr/>
           <p:nvPr/>
         </p:nvSpPr>
         <p:spPr>
           <a:xfrm>
-            <a:off x="7589520" y="2286000"/>
-            <a:ext cx="1005840" cy="457200"/>
+            <a:off x="6309360" y="1234440"/>
+            <a:ext cx="457200" cy="457200"/>
           </a:xfrm>
           <a:prstGeom prst="roundRect">
             <a:avLst>
@@ -8795,7 +8758,7 @@
             </a:avLst>
           </a:prstGeom>
           <a:solidFill>
-            <a:srgbClr val="AACCEE"/>
+            <a:srgbClr val="E67E22"/>
           </a:solidFill>
           <a:ln>
             <a:noFill/>
@@ -8820,107 +8783,39 @@
           <a:lstStyle/>
           <a:p>
             <a:pPr algn="ctr">
-              <a:defRPr sz="1200" b="1">
+              <a:defRPr sz="1800" b="1">
                 <a:solidFill>
                   <a:srgbClr val="FFFFFF"/>
                 </a:solidFill>
               </a:defRPr>
             </a:pPr>
             <a:r>
-              <a:t>Gene D</a:t>
-            </a:r>
-          </a:p>
-        </p:txBody>
-      </p:sp>
-      <p:sp>
-        <p:nvSpPr>
-          <p:cNvPr id="20" name="TextBox 19"/>
-          <p:cNvSpPr txBox="1"/>
-          <p:nvPr/>
-        </p:nvSpPr>
-        <p:spPr>
-          <a:xfrm>
-            <a:off x="7589520" y="2743200"/>
-            <a:ext cx="1005840" cy="274320"/>
-          </a:xfrm>
-          <a:prstGeom prst="rect">
-            <a:avLst/>
-          </a:prstGeom>
-          <a:noFill/>
-        </p:spPr>
-        <p:txBody>
-          <a:bodyPr wrap="none">
-            <a:spAutoFit/>
-          </a:bodyPr>
-          <a:lstStyle/>
-          <a:p>
-            <a:pPr algn="ctr">
-              <a:defRPr sz="1000" b="1">
-                <a:solidFill>
-                  <a:srgbClr val="88AACC"/>
-                </a:solidFill>
-              </a:defRPr>
-            </a:pPr>
-            <a:r>
-              <a:t>effect=0.20</a:t>
-            </a:r>
-          </a:p>
-        </p:txBody>
-      </p:sp>
-      <p:sp>
-        <p:nvSpPr>
-          <p:cNvPr id="21" name="TextBox 20"/>
-          <p:cNvSpPr txBox="1"/>
-          <p:nvPr/>
-        </p:nvSpPr>
-        <p:spPr>
-          <a:xfrm>
-            <a:off x="6675120" y="2148840"/>
-            <a:ext cx="640080" cy="274320"/>
-          </a:xfrm>
-          <a:prstGeom prst="rect">
-            <a:avLst/>
-          </a:prstGeom>
-          <a:noFill/>
-        </p:spPr>
-        <p:txBody>
-          <a:bodyPr wrap="none">
-            <a:spAutoFit/>
-          </a:bodyPr>
-          <a:lstStyle/>
-          <a:p>
-            <a:pPr algn="ctr">
-              <a:defRPr sz="900">
-                <a:solidFill>
-                  <a:srgbClr val="647487"/>
-                </a:solidFill>
-              </a:defRPr>
-            </a:pPr>
-            <a:r>
-              <a:t>MI=0.2</a:t>
-            </a:r>
-          </a:p>
-        </p:txBody>
-      </p:sp>
-      <p:sp>
-        <p:nvSpPr>
-          <p:cNvPr id="22" name="Rounded Rectangle 21"/>
+              <a:t>4</a:t>
+            </a:r>
+          </a:p>
+        </p:txBody>
+      </p:sp>
+      <p:sp>
+        <p:nvSpPr>
+          <p:cNvPr id="16" name="Rounded Rectangle 15"/>
           <p:cNvSpPr/>
           <p:nvPr/>
         </p:nvSpPr>
         <p:spPr>
           <a:xfrm>
-            <a:off x="10332720" y="1371600"/>
-            <a:ext cx="1645920" cy="1005840"/>
+            <a:off x="6858000" y="1234440"/>
+            <a:ext cx="4754880" cy="1371600"/>
           </a:xfrm>
           <a:prstGeom prst="roundRect">
             <a:avLst/>
           </a:prstGeom>
           <a:solidFill>
-            <a:srgbClr val="F5F7FA"/>
-          </a:solidFill>
-          <a:ln>
-            <a:noFill/>
+            <a:srgbClr val="FFF5EB"/>
+          </a:solidFill>
+          <a:ln w="25400">
+            <a:solidFill>
+              <a:srgbClr val="E67E22"/>
+            </a:solidFill>
           </a:ln>
         </p:spPr>
         <p:style>
@@ -8947,14 +8842,14 @@
       </p:sp>
       <p:sp>
         <p:nvSpPr>
-          <p:cNvPr id="23" name="TextBox 22"/>
+          <p:cNvPr id="17" name="TextBox 16"/>
           <p:cNvSpPr txBox="1"/>
           <p:nvPr/>
         </p:nvSpPr>
         <p:spPr>
           <a:xfrm>
-            <a:off x="10378440" y="1417320"/>
-            <a:ext cx="1554480" cy="914400"/>
+            <a:off x="6995160" y="1307592"/>
+            <a:ext cx="4480560" cy="1280160"/>
           </a:xfrm>
           <a:prstGeom prst="rect">
             <a:avLst/>
@@ -8968,52 +8863,64 @@
           <a:lstStyle/>
           <a:p>
             <a:pPr>
-              <a:defRPr sz="900">
+              <a:defRPr sz="1400" b="1">
+                <a:solidFill>
+                  <a:srgbClr val="E67E22"/>
+                </a:solidFill>
+              </a:defRPr>
+            </a:pPr>
+            <a:r>
+              <a:t>LINCS Perturbation Signatures</a:t>
+            </a:r>
+          </a:p>
+          <a:p>
+            <a:pPr>
+              <a:defRPr sz="1100">
                 <a:solidFill>
                   <a:srgbClr val="2D3A4A"/>
                 </a:solidFill>
               </a:defRPr>
             </a:pPr>
             <a:r>
-              <a:t>1.0 × 0.8 = 0.80</a:t>
+              <a:t>Gene/neighbor has LINCS signature?</a:t>
             </a:r>
           </a:p>
           <a:p>
             <a:pPr>
-              <a:defRPr sz="900">
-                <a:solidFill>
-                  <a:srgbClr val="2D3A4A"/>
-                </a:solidFill>
-              </a:defRPr>
-            </a:pPr>
-            <a:r>
-              <a:t>0.8 × 0.5 = 0.40</a:t>
+              <a:defRPr sz="1000">
+                <a:solidFill>
+                  <a:srgbClr val="2EA06A"/>
+                </a:solidFill>
+              </a:defRPr>
+            </a:pPr>
+            <a:r>
+              <a:t>YES → Map downstream → BFS → END</a:t>
             </a:r>
           </a:p>
           <a:p>
             <a:pPr>
-              <a:defRPr sz="900">
-                <a:solidFill>
-                  <a:srgbClr val="2D3A4A"/>
-                </a:solidFill>
-              </a:defRPr>
-            </a:pPr>
-            <a:r>
-              <a:t>1.0 × 0.2 = 0.20</a:t>
-            </a:r>
-          </a:p>
-        </p:txBody>
-      </p:sp>
-      <p:sp>
-        <p:nvSpPr>
-          <p:cNvPr id="24" name="Rounded Rectangle 23"/>
+              <a:defRPr sz="1000">
+                <a:solidFill>
+                  <a:srgbClr val="E86C2C"/>
+                </a:solidFill>
+              </a:defRPr>
+            </a:pPr>
+            <a:r>
+              <a:t>NO → continue to next fallback...</a:t>
+            </a:r>
+          </a:p>
+        </p:txBody>
+      </p:sp>
+      <p:sp>
+        <p:nvSpPr>
+          <p:cNvPr id="18" name="Rounded Rectangle 17"/>
           <p:cNvSpPr/>
           <p:nvPr/>
         </p:nvSpPr>
         <p:spPr>
           <a:xfrm>
-            <a:off x="457200" y="3200400"/>
-            <a:ext cx="731520" cy="640080"/>
+            <a:off x="6309360" y="2743200"/>
+            <a:ext cx="457200" cy="457200"/>
           </a:xfrm>
           <a:prstGeom prst="roundRect">
             <a:avLst>
@@ -9021,7 +8928,7 @@
             </a:avLst>
           </a:prstGeom>
           <a:solidFill>
-            <a:srgbClr val="1A568C"/>
+            <a:srgbClr val="1ABC9C"/>
           </a:solidFill>
           <a:ln>
             <a:noFill/>
@@ -9046,107 +8953,39 @@
           <a:lstStyle/>
           <a:p>
             <a:pPr algn="ctr">
-              <a:defRPr sz="2400" b="1">
+              <a:defRPr sz="1800" b="1">
                 <a:solidFill>
                   <a:srgbClr val="FFFFFF"/>
                 </a:solidFill>
               </a:defRPr>
             </a:pPr>
             <a:r>
-              <a:t>2</a:t>
-            </a:r>
-          </a:p>
-        </p:txBody>
-      </p:sp>
-      <p:sp>
-        <p:nvSpPr>
-          <p:cNvPr id="25" name="TextBox 24"/>
-          <p:cNvSpPr txBox="1"/>
-          <p:nvPr/>
-        </p:nvSpPr>
-        <p:spPr>
-          <a:xfrm>
-            <a:off x="1371600" y="3200400"/>
-            <a:ext cx="3657600" cy="457200"/>
-          </a:xfrm>
-          <a:prstGeom prst="rect">
-            <a:avLst/>
-          </a:prstGeom>
-          <a:noFill/>
-        </p:spPr>
-        <p:txBody>
-          <a:bodyPr wrap="none">
-            <a:spAutoFit/>
-          </a:bodyPr>
-          <a:lstStyle/>
-          <a:p>
-            <a:pPr>
-              <a:defRPr sz="2000" b="1">
-                <a:solidFill>
-                  <a:srgbClr val="1A568C"/>
-                </a:solidFill>
-              </a:defRPr>
-            </a:pPr>
-            <a:r>
-              <a:t>Embedding Similarity</a:t>
-            </a:r>
-          </a:p>
-        </p:txBody>
-      </p:sp>
-      <p:sp>
-        <p:nvSpPr>
-          <p:cNvPr id="26" name="TextBox 25"/>
-          <p:cNvSpPr txBox="1"/>
-          <p:nvPr/>
-        </p:nvSpPr>
-        <p:spPr>
-          <a:xfrm>
-            <a:off x="1371600" y="3611880"/>
-            <a:ext cx="4572000" cy="731520"/>
-          </a:xfrm>
-          <a:prstGeom prst="rect">
-            <a:avLst/>
-          </a:prstGeom>
-          <a:noFill/>
-        </p:spPr>
-        <p:txBody>
-          <a:bodyPr wrap="square">
-            <a:spAutoFit/>
-          </a:bodyPr>
-          <a:lstStyle/>
-          <a:p>
-            <a:pPr>
-              <a:defRPr sz="1400">
-                <a:solidFill>
-                  <a:srgbClr val="2D3A4A"/>
-                </a:solidFill>
-              </a:defRPr>
-            </a:pPr>
-            <a:r>
-              <a:t>256-dim gene vectors trained on 11M cells. High cosine similarity = functionally related, even without network edge.</a:t>
-            </a:r>
-          </a:p>
-        </p:txBody>
-      </p:sp>
-      <p:sp>
-        <p:nvSpPr>
-          <p:cNvPr id="27" name="Rounded Rectangle 26"/>
+              <a:t>5</a:t>
+            </a:r>
+          </a:p>
+        </p:txBody>
+      </p:sp>
+      <p:sp>
+        <p:nvSpPr>
+          <p:cNvPr id="19" name="Rounded Rectangle 18"/>
           <p:cNvSpPr/>
           <p:nvPr/>
         </p:nvSpPr>
         <p:spPr>
           <a:xfrm>
-            <a:off x="6217920" y="3200400"/>
-            <a:ext cx="5486400" cy="914400"/>
+            <a:off x="6858000" y="2743200"/>
+            <a:ext cx="4754880" cy="1371600"/>
           </a:xfrm>
           <a:prstGeom prst="roundRect">
             <a:avLst/>
           </a:prstGeom>
           <a:solidFill>
-            <a:srgbClr val="F5F7FA"/>
-          </a:solidFill>
-          <a:ln>
-            <a:noFill/>
+            <a:srgbClr val="E8F8F5"/>
+          </a:solidFill>
+          <a:ln w="25400">
+            <a:solidFill>
+              <a:srgbClr val="1ABC9C"/>
+            </a:solidFill>
           </a:ln>
         </p:spPr>
         <p:style>
@@ -9173,14 +9012,14 @@
       </p:sp>
       <p:sp>
         <p:nvSpPr>
-          <p:cNvPr id="28" name="TextBox 27"/>
+          <p:cNvPr id="20" name="TextBox 19"/>
           <p:cNvSpPr txBox="1"/>
           <p:nvPr/>
         </p:nvSpPr>
         <p:spPr>
           <a:xfrm>
-            <a:off x="6309360" y="3291840"/>
-            <a:ext cx="5303520" cy="777240"/>
+            <a:off x="6995160" y="2816352"/>
+            <a:ext cx="4480560" cy="1280160"/>
           </a:xfrm>
           <a:prstGeom prst="rect">
             <a:avLst/>
@@ -9194,42 +9033,64 @@
           <a:lstStyle/>
           <a:p>
             <a:pPr>
-              <a:defRPr sz="1200">
+              <a:defRPr sz="1400" b="1">
+                <a:solidFill>
+                  <a:srgbClr val="1ABC9C"/>
+                </a:solidFill>
+              </a:defRPr>
+            </a:pPr>
+            <a:r>
+              <a:t>Super-Enhancer (Chromatin)</a:t>
+            </a:r>
+          </a:p>
+          <a:p>
+            <a:pPr>
+              <a:defRPr sz="1100">
                 <a:solidFill>
                   <a:srgbClr val="2D3A4A"/>
                 </a:solidFill>
-                <a:latin typeface="Consolas"/>
-              </a:defRPr>
-            </a:pPr>
-            <a:r>
-              <a:t>MYC   [0.23, -0.15, 0.87, ...]    similarity</a:t>
+              </a:defRPr>
+            </a:pPr>
+            <a:r>
+              <a:t>Gene associated with super-enhancer?</a:t>
             </a:r>
           </a:p>
           <a:p>
             <a:pPr>
-              <a:defRPr sz="1200">
-                <a:solidFill>
-                  <a:srgbClr val="2D3A4A"/>
-                </a:solidFill>
-                <a:latin typeface="Consolas"/>
-              </a:defRPr>
-            </a:pPr>
-            <a:r>
-              <a:t>BRCA1 [0.21, -0.18, 0.85, ...]  →  0.94</a:t>
-            </a:r>
-          </a:p>
-        </p:txBody>
-      </p:sp>
-      <p:sp>
-        <p:nvSpPr>
-          <p:cNvPr id="29" name="Rounded Rectangle 28"/>
+              <a:defRPr sz="1000">
+                <a:solidFill>
+                  <a:srgbClr val="2EA06A"/>
+                </a:solidFill>
+              </a:defRPr>
+            </a:pPr>
+            <a:r>
+              <a:t>YES → Route to SE-bound TFs → BFS → END</a:t>
+            </a:r>
+          </a:p>
+          <a:p>
+            <a:pPr>
+              <a:defRPr sz="1000">
+                <a:solidFill>
+                  <a:srgbClr val="E86C2C"/>
+                </a:solidFill>
+              </a:defRPr>
+            </a:pPr>
+            <a:r>
+              <a:t>NO → continue to final fallback...</a:t>
+            </a:r>
+          </a:p>
+        </p:txBody>
+      </p:sp>
+      <p:sp>
+        <p:nvSpPr>
+          <p:cNvPr id="21" name="Rounded Rectangle 20"/>
           <p:cNvSpPr/>
           <p:nvPr/>
         </p:nvSpPr>
         <p:spPr>
           <a:xfrm>
-            <a:off x="457200" y="4297680"/>
-            <a:ext cx="731520" cy="640080"/>
+            <a:off x="6309360" y="4251960"/>
+            <a:ext cx="457200" cy="457200"/>
           </a:xfrm>
           <a:prstGeom prst="roundRect">
             <a:avLst>
@@ -9237,7 +9098,7 @@
             </a:avLst>
           </a:prstGeom>
           <a:solidFill>
-            <a:srgbClr val="2EA06A"/>
+            <a:srgbClr val="95A5A6"/>
           </a:solidFill>
           <a:ln>
             <a:noFill/>
@@ -9262,107 +9123,39 @@
           <a:lstStyle/>
           <a:p>
             <a:pPr algn="ctr">
-              <a:defRPr sz="2400" b="1">
+              <a:defRPr sz="1800" b="1">
                 <a:solidFill>
                   <a:srgbClr val="FFFFFF"/>
                 </a:solidFill>
               </a:defRPr>
             </a:pPr>
             <a:r>
-              <a:t>3</a:t>
-            </a:r>
-          </a:p>
-        </p:txBody>
-      </p:sp>
-      <p:sp>
-        <p:nvSpPr>
-          <p:cNvPr id="30" name="TextBox 29"/>
-          <p:cNvSpPr txBox="1"/>
-          <p:nvPr/>
-        </p:nvSpPr>
-        <p:spPr>
-          <a:xfrm>
-            <a:off x="1371600" y="4297680"/>
-            <a:ext cx="3657600" cy="457200"/>
-          </a:xfrm>
-          <a:prstGeom prst="rect">
-            <a:avLst/>
-          </a:prstGeom>
-          <a:noFill/>
-        </p:spPr>
-        <p:txBody>
-          <a:bodyPr wrap="none">
-            <a:spAutoFit/>
-          </a:bodyPr>
-          <a:lstStyle/>
-          <a:p>
-            <a:pPr>
-              <a:defRPr sz="2000" b="1">
-                <a:solidFill>
-                  <a:srgbClr val="2EA06A"/>
-                </a:solidFill>
-              </a:defRPr>
-            </a:pPr>
-            <a:r>
-              <a:t>Combined Scoring</a:t>
-            </a:r>
-          </a:p>
-        </p:txBody>
-      </p:sp>
-      <p:sp>
-        <p:nvSpPr>
-          <p:cNvPr id="31" name="TextBox 30"/>
-          <p:cNvSpPr txBox="1"/>
-          <p:nvPr/>
-        </p:nvSpPr>
-        <p:spPr>
-          <a:xfrm>
-            <a:off x="1371600" y="4709160"/>
-            <a:ext cx="4572000" cy="731520"/>
-          </a:xfrm>
-          <a:prstGeom prst="rect">
-            <a:avLst/>
-          </a:prstGeom>
-          <a:noFill/>
-        </p:spPr>
-        <p:txBody>
-          <a:bodyPr wrap="square">
-            <a:spAutoFit/>
-          </a:bodyPr>
-          <a:lstStyle/>
-          <a:p>
-            <a:pPr>
-              <a:defRPr sz="1400">
-                <a:solidFill>
-                  <a:srgbClr val="2D3A4A"/>
-                </a:solidFill>
-              </a:defRPr>
-            </a:pPr>
-            <a:r>
-              <a:t>Network provides structure, embeddings boost confidence. Captures both direct and indirect relationships.</a:t>
-            </a:r>
-          </a:p>
-        </p:txBody>
-      </p:sp>
-      <p:sp>
-        <p:nvSpPr>
-          <p:cNvPr id="32" name="Rounded Rectangle 31"/>
+              <a:t>6</a:t>
+            </a:r>
+          </a:p>
+        </p:txBody>
+      </p:sp>
+      <p:sp>
+        <p:nvSpPr>
+          <p:cNvPr id="22" name="Rounded Rectangle 21"/>
           <p:cNvSpPr/>
           <p:nvPr/>
         </p:nvSpPr>
         <p:spPr>
           <a:xfrm>
-            <a:off x="6217920" y="4297680"/>
-            <a:ext cx="5486400" cy="1097280"/>
+            <a:off x="6858000" y="4251960"/>
+            <a:ext cx="4754880" cy="1371600"/>
           </a:xfrm>
           <a:prstGeom prst="roundRect">
             <a:avLst/>
           </a:prstGeom>
           <a:solidFill>
-            <a:srgbClr val="0D2B4A"/>
-          </a:solidFill>
-          <a:ln>
-            <a:noFill/>
+            <a:srgbClr val="F5F5F5"/>
+          </a:solidFill>
+          <a:ln w="25400">
+            <a:solidFill>
+              <a:srgbClr val="95A5A6"/>
+            </a:solidFill>
           </a:ln>
         </p:spPr>
         <p:style>
@@ -9389,14 +9182,14 @@
       </p:sp>
       <p:sp>
         <p:nvSpPr>
-          <p:cNvPr id="33" name="TextBox 32"/>
+          <p:cNvPr id="23" name="TextBox 22"/>
           <p:cNvSpPr txBox="1"/>
           <p:nvPr/>
         </p:nvSpPr>
         <p:spPr>
           <a:xfrm>
-            <a:off x="6400800" y="4434840"/>
-            <a:ext cx="5120640" cy="914400"/>
+            <a:off x="6995160" y="4325112"/>
+            <a:ext cx="4480560" cy="1280160"/>
           </a:xfrm>
           <a:prstGeom prst="rect">
             <a:avLst/>
@@ -9410,52 +9203,107 @@
           <a:lstStyle/>
           <a:p>
             <a:pPr>
-              <a:defRPr sz="1300">
-                <a:solidFill>
-                  <a:srgbClr val="FFFFFF"/>
-                </a:solidFill>
-              </a:defRPr>
-            </a:pPr>
-            <a:r>
-              <a:t>combined_effect =</a:t>
+              <a:defRPr sz="1400" b="1">
+                <a:solidFill>
+                  <a:srgbClr val="95A5A6"/>
+                </a:solidFill>
+              </a:defRPr>
+            </a:pPr>
+            <a:r>
+              <a:t>Minimal: Embedding-Only Ranking</a:t>
             </a:r>
           </a:p>
           <a:p>
             <a:pPr>
-              <a:defRPr sz="1300">
-                <a:solidFill>
-                  <a:srgbClr val="009B9E"/>
-                </a:solidFill>
-              </a:defRPr>
-            </a:pPr>
-            <a:r>
-              <a:t>    0.7 × network_effect</a:t>
+              <a:defRPr sz="1100">
+                <a:solidFill>
+                  <a:srgbClr val="2D3A4A"/>
+                </a:solidFill>
+              </a:defRPr>
+            </a:pPr>
+            <a:r>
+              <a:t>No GRN, STRING, LINCS, or SE available</a:t>
             </a:r>
           </a:p>
           <a:p>
             <a:pPr>
-              <a:defRPr sz="1300">
-                <a:solidFill>
-                  <a:srgbClr val="3A8DC1"/>
-                </a:solidFill>
-              </a:defRPr>
-            </a:pPr>
-            <a:r>
-              <a:t>  + 0.3 × embedding_similarity × network_effect</a:t>
-            </a:r>
-          </a:p>
-        </p:txBody>
-      </p:sp>
-      <p:sp>
-        <p:nvSpPr>
-          <p:cNvPr id="34" name="TextBox 33"/>
+              <a:defRPr sz="1000">
+                <a:solidFill>
+                  <a:srgbClr val="1A568C"/>
+                </a:solidFill>
+              </a:defRPr>
+            </a:pPr>
+            <a:r>
+              <a:t>Return embedding similarity ranking</a:t>
+            </a:r>
+          </a:p>
+          <a:p>
+            <a:pPr>
+              <a:defRPr sz="1000">
+                <a:solidFill>
+                  <a:srgbClr val="647487"/>
+                </a:solidFill>
+              </a:defRPr>
+            </a:pPr>
+            <a:r>
+              <a:t>→ END (lowest confidence)</a:t>
+            </a:r>
+          </a:p>
+        </p:txBody>
+      </p:sp>
+      <p:sp>
+        <p:nvSpPr>
+          <p:cNvPr id="24" name="Right Arrow 23"/>
+          <p:cNvSpPr/>
+          <p:nvPr/>
+        </p:nvSpPr>
+        <p:spPr>
+          <a:xfrm>
+            <a:off x="5486400" y="1828800"/>
+            <a:ext cx="731520" cy="274320"/>
+          </a:xfrm>
+          <a:prstGeom prst="rightArrow">
+            <a:avLst/>
+          </a:prstGeom>
+          <a:solidFill>
+            <a:srgbClr val="647487"/>
+          </a:solidFill>
+          <a:ln>
+            <a:noFill/>
+          </a:ln>
+        </p:spPr>
+        <p:style>
+          <a:lnRef idx="1">
+            <a:schemeClr val="accent1"/>
+          </a:lnRef>
+          <a:fillRef idx="3">
+            <a:schemeClr val="accent1"/>
+          </a:fillRef>
+          <a:effectRef idx="2">
+            <a:schemeClr val="accent1"/>
+          </a:effectRef>
+          <a:fontRef idx="minor">
+            <a:schemeClr val="lt1"/>
+          </a:fontRef>
+        </p:style>
+        <p:txBody>
+          <a:bodyPr rtlCol="0" anchor="ctr"/>
+          <a:lstStyle/>
+          <a:p>
+            <a:pPr algn="ctr"/>
+          </a:p>
+        </p:txBody>
+      </p:sp>
+      <p:sp>
+        <p:nvSpPr>
+          <p:cNvPr id="25" name="TextBox 24"/>
           <p:cNvSpPr txBox="1"/>
           <p:nvPr/>
         </p:nvSpPr>
         <p:spPr>
           <a:xfrm>
-            <a:off x="457200" y="5669280"/>
-            <a:ext cx="11277295" cy="731520"/>
+            <a:off x="365760" y="5852160"/>
+            <a:ext cx="11430000" cy="457200"/>
           </a:xfrm>
           <a:prstGeom prst="rect">
             <a:avLst/>
@@ -9469,14 +9317,14 @@
           <a:lstStyle/>
           <a:p>
             <a:pPr algn="ctr">
-              <a:defRPr sz="1500" i="1">
+              <a:defRPr sz="1300" i="1">
                 <a:solidFill>
                   <a:srgbClr val="647487"/>
                 </a:solidFill>
               </a:defRPr>
             </a:pPr>
             <a:r>
-              <a:t>Result: Genes ranked by predicted impact. Network-only and embedding-only effects also reported separately.</a:t>
+              <a:t>Each step tries to route the perturbation to GRN-active nodes. Falls through only if no valid route found.</a:t>
             </a:r>
           </a:p>
         </p:txBody>

</xml_diff>

<commit_message>
Add detailed perturbation scoring equations to slide 5
Shows three-part formula:
- Network Effect: E_net(t) = ∏ MI(e) for edges r→t
- Embedding Similarity: E_emb(t) = cos(v_g, v_t)
- Combined: E(t) = E_net × (α + (1-α) × E_emb)

Where α = 0.7 (70% network, 30% embedding boost)

Co-Authored-By: Claude Opus 4.5 <noreply@anthropic.com>
</commit_message>
<xml_diff>
--- a/GREmLN_MCP_Server_Presentation.pptx
+++ b/GREmLN_MCP_Server_Presentation.pptx
@@ -11694,7 +11694,7 @@
         <p:spPr>
           <a:xfrm>
             <a:off x="7589520" y="1097280"/>
-            <a:ext cx="4114800" cy="5029200"/>
+            <a:ext cx="4114800" cy="1737360"/>
           </a:xfrm>
           <a:prstGeom prst="roundRect">
             <a:avLst/>
@@ -11773,8 +11773,8 @@
         </p:nvSpPr>
         <p:spPr>
           <a:xfrm>
-            <a:off x="7772400" y="1600200"/>
-            <a:ext cx="3749039" cy="4389120"/>
+            <a:off x="7772400" y="1508760"/>
+            <a:ext cx="3749039" cy="1280160"/>
           </a:xfrm>
           <a:prstGeom prst="rect">
             <a:avLst/>
@@ -11791,193 +11791,429 @@
               <a:spcBef>
                 <a:spcPts val="0"/>
               </a:spcBef>
-              <a:defRPr sz="1100" b="1">
+              <a:defRPr sz="900" b="0">
                 <a:solidFill>
                   <a:srgbClr val="00D4AA"/>
                 </a:solidFill>
               </a:defRPr>
             </a:pPr>
             <a:r>
-              <a:t>1. GRN Edges</a:t>
+              <a:t>1. GRN Edges: Direct regulatory targets</a:t>
             </a:r>
           </a:p>
           <a:p>
             <a:pPr>
               <a:spcBef>
-                <a:spcPts val="0"/>
+                <a:spcPts val="200"/>
               </a:spcBef>
-              <a:defRPr sz="1000">
-                <a:solidFill>
-                  <a:srgbClr val="2C3E50"/>
+              <a:defRPr sz="900" b="0">
+                <a:solidFill>
+                  <a:srgbClr val="4A69BD"/>
                 </a:solidFill>
               </a:defRPr>
             </a:pPr>
             <a:r>
-              <a:t>Direct regulatory targets</a:t>
+              <a:t>2. STRING: Protein interaction partners</a:t>
             </a:r>
           </a:p>
           <a:p>
             <a:pPr>
               <a:spcBef>
-                <a:spcPts val="800"/>
+                <a:spcPts val="200"/>
               </a:spcBef>
-              <a:defRPr sz="1100" b="1">
-                <a:solidFill>
-                  <a:srgbClr val="4A69BD"/>
+              <a:defRPr sz="900" b="0">
+                <a:solidFill>
+                  <a:srgbClr val="9D4EDD"/>
                 </a:solidFill>
               </a:defRPr>
             </a:pPr>
             <a:r>
-              <a:t>2. STRING</a:t>
+              <a:t>3. Embeddings: Functionally similar genes</a:t>
             </a:r>
           </a:p>
           <a:p>
             <a:pPr>
               <a:spcBef>
-                <a:spcPts val="0"/>
+                <a:spcPts val="200"/>
               </a:spcBef>
-              <a:defRPr sz="1000">
-                <a:solidFill>
-                  <a:srgbClr val="2C3E50"/>
+              <a:defRPr sz="900" b="0">
+                <a:solidFill>
+                  <a:srgbClr val="FF6B6B"/>
                 </a:solidFill>
               </a:defRPr>
             </a:pPr>
             <a:r>
-              <a:t>Protein interaction partners</a:t>
+              <a:t>4. LINCS: Perturbation signatures</a:t>
             </a:r>
           </a:p>
           <a:p>
             <a:pPr>
               <a:spcBef>
-                <a:spcPts val="800"/>
+                <a:spcPts val="200"/>
               </a:spcBef>
-              <a:defRPr sz="1100" b="1">
-                <a:solidFill>
-                  <a:srgbClr val="9D4EDD"/>
+              <a:defRPr sz="900" b="0">
+                <a:solidFill>
+                  <a:srgbClr val="00C98D"/>
                 </a:solidFill>
               </a:defRPr>
             </a:pPr>
             <a:r>
-              <a:t>3. Embeddings</a:t>
+              <a:t>5. Super-enhancer: Chromatin-linked TFs</a:t>
             </a:r>
           </a:p>
           <a:p>
             <a:pPr>
               <a:spcBef>
-                <a:spcPts val="0"/>
+                <a:spcPts val="200"/>
               </a:spcBef>
-              <a:defRPr sz="1000">
-                <a:solidFill>
-                  <a:srgbClr val="2C3E50"/>
+              <a:defRPr sz="900" b="0">
+                <a:solidFill>
+                  <a:srgbClr val="6C757D"/>
                 </a:solidFill>
               </a:defRPr>
             </a:pPr>
             <a:r>
-              <a:t>Functionally similar genes</a:t>
-            </a:r>
-          </a:p>
+              <a:t>6. Embed-only: Lowest confidence fallback</a:t>
+            </a:r>
+          </a:p>
+        </p:txBody>
+      </p:sp>
+      <p:sp>
+        <p:nvSpPr>
+          <p:cNvPr id="85" name="Rounded Rectangle 84"/>
+          <p:cNvSpPr/>
+          <p:nvPr/>
+        </p:nvSpPr>
+        <p:spPr>
+          <a:xfrm>
+            <a:off x="7680960" y="3931920"/>
+            <a:ext cx="3931920" cy="3200400"/>
+          </a:xfrm>
+          <a:prstGeom prst="roundRect">
+            <a:avLst/>
+          </a:prstGeom>
+          <a:solidFill>
+            <a:srgbClr val="1A1A2E"/>
+          </a:solidFill>
+          <a:ln>
+            <a:noFill/>
+          </a:ln>
+        </p:spPr>
+        <p:style>
+          <a:lnRef idx="1">
+            <a:schemeClr val="accent1"/>
+          </a:lnRef>
+          <a:fillRef idx="3">
+            <a:schemeClr val="accent1"/>
+          </a:fillRef>
+          <a:effectRef idx="2">
+            <a:schemeClr val="accent1"/>
+          </a:effectRef>
+          <a:fontRef idx="minor">
+            <a:schemeClr val="lt1"/>
+          </a:fontRef>
+        </p:style>
+        <p:txBody>
+          <a:bodyPr rtlCol="0" anchor="ctr"/>
+          <a:lstStyle/>
+          <a:p>
+            <a:pPr algn="ctr"/>
+          </a:p>
+        </p:txBody>
+      </p:sp>
+      <p:sp>
+        <p:nvSpPr>
+          <p:cNvPr id="86" name="TextBox 85"/>
+          <p:cNvSpPr txBox="1"/>
+          <p:nvPr/>
+        </p:nvSpPr>
+        <p:spPr>
+          <a:xfrm>
+            <a:off x="7772400" y="4005072"/>
+            <a:ext cx="3749039" cy="274320"/>
+          </a:xfrm>
+          <a:prstGeom prst="rect">
+            <a:avLst/>
+          </a:prstGeom>
+          <a:noFill/>
+        </p:spPr>
+        <p:txBody>
+          <a:bodyPr wrap="none">
+            <a:spAutoFit/>
+          </a:bodyPr>
+          <a:lstStyle/>
           <a:p>
             <a:pPr>
-              <a:spcBef>
-                <a:spcPts val="800"/>
-              </a:spcBef>
               <a:defRPr sz="1100" b="1">
                 <a:solidFill>
-                  <a:srgbClr val="FF6B6B"/>
+                  <a:srgbClr val="00D4AA"/>
                 </a:solidFill>
               </a:defRPr>
             </a:pPr>
             <a:r>
-              <a:t>4. LINCS</a:t>
-            </a:r>
-          </a:p>
+              <a:t>Perturbation Scoring</a:t>
+            </a:r>
+          </a:p>
+        </p:txBody>
+      </p:sp>
+      <p:sp>
+        <p:nvSpPr>
+          <p:cNvPr id="87" name="TextBox 86"/>
+          <p:cNvSpPr txBox="1"/>
+          <p:nvPr/>
+        </p:nvSpPr>
+        <p:spPr>
+          <a:xfrm>
+            <a:off x="7772400" y="4251960"/>
+            <a:ext cx="3749039" cy="228600"/>
+          </a:xfrm>
+          <a:prstGeom prst="rect">
+            <a:avLst/>
+          </a:prstGeom>
+          <a:noFill/>
+        </p:spPr>
+        <p:txBody>
+          <a:bodyPr wrap="none">
+            <a:spAutoFit/>
+          </a:bodyPr>
+          <a:lstStyle/>
           <a:p>
             <a:pPr>
-              <a:spcBef>
-                <a:spcPts val="0"/>
-              </a:spcBef>
-              <a:defRPr sz="1000">
-                <a:solidFill>
-                  <a:srgbClr val="2C3E50"/>
+              <a:defRPr sz="900">
+                <a:solidFill>
+                  <a:srgbClr val="88CCBB"/>
                 </a:solidFill>
               </a:defRPr>
             </a:pPr>
             <a:r>
-              <a:t>Perturbation signatures</a:t>
-            </a:r>
-          </a:p>
+              <a:t>Network Effect (BFS propagation):</a:t>
+            </a:r>
+          </a:p>
+        </p:txBody>
+      </p:sp>
+      <p:sp>
+        <p:nvSpPr>
+          <p:cNvPr id="88" name="TextBox 87"/>
+          <p:cNvSpPr txBox="1"/>
+          <p:nvPr/>
+        </p:nvSpPr>
+        <p:spPr>
+          <a:xfrm>
+            <a:off x="7772400" y="4434840"/>
+            <a:ext cx="3749039" cy="320040"/>
+          </a:xfrm>
+          <a:prstGeom prst="rect">
+            <a:avLst/>
+          </a:prstGeom>
+          <a:noFill/>
+        </p:spPr>
+        <p:txBody>
+          <a:bodyPr wrap="none">
+            <a:spAutoFit/>
+          </a:bodyPr>
+          <a:lstStyle/>
           <a:p>
             <a:pPr>
-              <a:spcBef>
-                <a:spcPts val="800"/>
-              </a:spcBef>
-              <a:defRPr sz="1100" b="1">
-                <a:solidFill>
-                  <a:srgbClr val="00C98D"/>
-                </a:solidFill>
+              <a:defRPr sz="1200" b="1">
+                <a:solidFill>
+                  <a:srgbClr val="FFFFFF"/>
+                </a:solidFill>
+                <a:latin typeface="Consolas"/>
               </a:defRPr>
             </a:pPr>
             <a:r>
-              <a:t>5. Super-enhancer</a:t>
-            </a:r>
-          </a:p>
+              <a:t>E_net(t) = ∏ MI(e)  for edges r→t</a:t>
+            </a:r>
+          </a:p>
+        </p:txBody>
+      </p:sp>
+      <p:sp>
+        <p:nvSpPr>
+          <p:cNvPr id="89" name="TextBox 88"/>
+          <p:cNvSpPr txBox="1"/>
+          <p:nvPr/>
+        </p:nvSpPr>
+        <p:spPr>
+          <a:xfrm>
+            <a:off x="7772400" y="4754880"/>
+            <a:ext cx="3749039" cy="228600"/>
+          </a:xfrm>
+          <a:prstGeom prst="rect">
+            <a:avLst/>
+          </a:prstGeom>
+          <a:noFill/>
+        </p:spPr>
+        <p:txBody>
+          <a:bodyPr wrap="none">
+            <a:spAutoFit/>
+          </a:bodyPr>
+          <a:lstStyle/>
           <a:p>
             <a:pPr>
-              <a:spcBef>
-                <a:spcPts val="0"/>
-              </a:spcBef>
-              <a:defRPr sz="1000">
-                <a:solidFill>
-                  <a:srgbClr val="2C3E50"/>
+              <a:defRPr sz="900">
+                <a:solidFill>
+                  <a:srgbClr val="BB88DD"/>
                 </a:solidFill>
               </a:defRPr>
             </a:pPr>
             <a:r>
-              <a:t>Chromatin-linked TFs</a:t>
-            </a:r>
-          </a:p>
+              <a:t>Embedding Similarity:</a:t>
+            </a:r>
+          </a:p>
+        </p:txBody>
+      </p:sp>
+      <p:sp>
+        <p:nvSpPr>
+          <p:cNvPr id="90" name="TextBox 89"/>
+          <p:cNvSpPr txBox="1"/>
+          <p:nvPr/>
+        </p:nvSpPr>
+        <p:spPr>
+          <a:xfrm>
+            <a:off x="7772400" y="4937760"/>
+            <a:ext cx="3749039" cy="320040"/>
+          </a:xfrm>
+          <a:prstGeom prst="rect">
+            <a:avLst/>
+          </a:prstGeom>
+          <a:noFill/>
+        </p:spPr>
+        <p:txBody>
+          <a:bodyPr wrap="none">
+            <a:spAutoFit/>
+          </a:bodyPr>
+          <a:lstStyle/>
           <a:p>
             <a:pPr>
-              <a:spcBef>
-                <a:spcPts val="800"/>
-              </a:spcBef>
-              <a:defRPr sz="1100" b="1">
-                <a:solidFill>
-                  <a:srgbClr val="6C757D"/>
-                </a:solidFill>
+              <a:defRPr sz="1200" b="1">
+                <a:solidFill>
+                  <a:srgbClr val="FFFFFF"/>
+                </a:solidFill>
+                <a:latin typeface="Consolas"/>
               </a:defRPr>
             </a:pPr>
             <a:r>
-              <a:t>6. Embed-only</a:t>
-            </a:r>
-          </a:p>
+              <a:t>E_emb(t) = cos(v_g, v_t)</a:t>
+            </a:r>
+          </a:p>
+        </p:txBody>
+      </p:sp>
+      <p:sp>
+        <p:nvSpPr>
+          <p:cNvPr id="91" name="TextBox 90"/>
+          <p:cNvSpPr txBox="1"/>
+          <p:nvPr/>
+        </p:nvSpPr>
+        <p:spPr>
+          <a:xfrm>
+            <a:off x="7772400" y="5257800"/>
+            <a:ext cx="3749039" cy="228600"/>
+          </a:xfrm>
+          <a:prstGeom prst="rect">
+            <a:avLst/>
+          </a:prstGeom>
+          <a:noFill/>
+        </p:spPr>
+        <p:txBody>
+          <a:bodyPr wrap="none">
+            <a:spAutoFit/>
+          </a:bodyPr>
+          <a:lstStyle/>
           <a:p>
             <a:pPr>
-              <a:spcBef>
-                <a:spcPts val="0"/>
-              </a:spcBef>
-              <a:defRPr sz="1000">
-                <a:solidFill>
-                  <a:srgbClr val="2C3E50"/>
+              <a:defRPr sz="900">
+                <a:solidFill>
+                  <a:srgbClr val="FFCC66"/>
                 </a:solidFill>
               </a:defRPr>
             </a:pPr>
             <a:r>
-              <a:t>Lowest confidence fallback</a:t>
-            </a:r>
-          </a:p>
-        </p:txBody>
-      </p:sp>
-      <p:sp>
-        <p:nvSpPr>
-          <p:cNvPr id="85" name="TextBox 84"/>
+              <a:t>Combined Effect:</a:t>
+            </a:r>
+          </a:p>
+        </p:txBody>
+      </p:sp>
+      <p:sp>
+        <p:nvSpPr>
+          <p:cNvPr id="92" name="TextBox 91"/>
           <p:cNvSpPr txBox="1"/>
           <p:nvPr/>
         </p:nvSpPr>
         <p:spPr>
           <a:xfrm>
-            <a:off x="7772400" y="5120640"/>
-            <a:ext cx="3749039" cy="914400"/>
+            <a:off x="7772400" y="5440680"/>
+            <a:ext cx="3749039" cy="457200"/>
+          </a:xfrm>
+          <a:prstGeom prst="rect">
+            <a:avLst/>
+          </a:prstGeom>
+          <a:noFill/>
+        </p:spPr>
+        <p:txBody>
+          <a:bodyPr wrap="none">
+            <a:spAutoFit/>
+          </a:bodyPr>
+          <a:lstStyle/>
+          <a:p>
+            <a:pPr>
+              <a:defRPr sz="1200" b="1">
+                <a:solidFill>
+                  <a:srgbClr val="FFFFFF"/>
+                </a:solidFill>
+                <a:latin typeface="Consolas"/>
+              </a:defRPr>
+            </a:pPr>
+            <a:r>
+              <a:t>E(t) = E_net × (α + (1-α) × E_emb)</a:t>
+            </a:r>
+          </a:p>
+        </p:txBody>
+      </p:sp>
+      <p:sp>
+        <p:nvSpPr>
+          <p:cNvPr id="93" name="TextBox 92"/>
+          <p:cNvSpPr txBox="1"/>
+          <p:nvPr/>
+        </p:nvSpPr>
+        <p:spPr>
+          <a:xfrm>
+            <a:off x="7772400" y="5806440"/>
+            <a:ext cx="3749039" cy="228600"/>
+          </a:xfrm>
+          <a:prstGeom prst="rect">
+            <a:avLst/>
+          </a:prstGeom>
+          <a:noFill/>
+        </p:spPr>
+        <p:txBody>
+          <a:bodyPr wrap="none">
+            <a:spAutoFit/>
+          </a:bodyPr>
+          <a:lstStyle/>
+          <a:p>
+            <a:pPr>
+              <a:defRPr sz="900" i="1">
+                <a:solidFill>
+                  <a:srgbClr val="AABBCC"/>
+                </a:solidFill>
+              </a:defRPr>
+            </a:pPr>
+            <a:r>
+              <a:t>where α = 0.7 (network weight)</a:t>
+            </a:r>
+          </a:p>
+        </p:txBody>
+      </p:sp>
+      <p:sp>
+        <p:nvSpPr>
+          <p:cNvPr id="94" name="TextBox 93"/>
+          <p:cNvSpPr txBox="1"/>
+          <p:nvPr/>
+        </p:nvSpPr>
+        <p:spPr>
+          <a:xfrm>
+            <a:off x="7772400" y="6080760"/>
+            <a:ext cx="3749039" cy="1005840"/>
           </a:xfrm>
           <a:prstGeom prst="rect">
             <a:avLst/>
@@ -11991,14 +12227,38 @@
           <a:lstStyle/>
           <a:p>
             <a:pPr>
-              <a:defRPr sz="1000" i="1">
-                <a:solidFill>
-                  <a:srgbClr val="6C757D"/>
+              <a:defRPr sz="800">
+                <a:solidFill>
+                  <a:srgbClr val="00D4AA"/>
                 </a:solidFill>
               </a:defRPr>
             </a:pPr>
             <a:r>
-              <a:t>Goal: Route every perturbation to GRN-active nodes for BFS propagation</a:t>
+              <a:t>r = Route(g) → GRN-active node</a:t>
+            </a:r>
+          </a:p>
+          <a:p>
+            <a:pPr>
+              <a:defRPr sz="800">
+                <a:solidFill>
+                  <a:srgbClr val="99AABB"/>
+                </a:solidFill>
+              </a:defRPr>
+            </a:pPr>
+            <a:r>
+              <a:t>v_g, v_t = 256-dim gene embeddings</a:t>
+            </a:r>
+          </a:p>
+          <a:p>
+            <a:pPr>
+              <a:defRPr sz="800">
+                <a:solidFill>
+                  <a:srgbClr val="99AABB"/>
+                </a:solidFill>
+              </a:defRPr>
+            </a:pPr>
+            <a:r>
+              <a:t>MI(e) = mutual information edge weight</a:t>
             </a:r>
           </a:p>
         </p:txBody>

</xml_diff>